<commit_message>
Lab finished. Exam passed.
</commit_message>
<xml_diff>
--- a/Phys_Labs/5_sem/Exam lab/Exam Lab.pptx
+++ b/Phys_Labs/5_sem/Exam lab/Exam Lab.pptx
@@ -7282,10 +7282,10 @@
       </p:sp>
       <p:pic>
         <p:nvPicPr>
-          <p:cNvPr id="2" name="Рисунок 1">
+          <p:cNvPr id="3" name="Рисунок 2">
             <a:extLst>
               <a:ext uri="{FF2B5EF4-FFF2-40B4-BE49-F238E27FC236}">
-                <a16:creationId xmlns:a16="http://schemas.microsoft.com/office/drawing/2014/main" id="{99A03135-5C36-4F50-8E30-EB367E83323C}"/>
+                <a16:creationId xmlns:a16="http://schemas.microsoft.com/office/drawing/2014/main" id="{8A499348-19ED-4A6A-84A9-17EADD902066}"/>
               </a:ext>
             </a:extLst>
           </p:cNvPr>
@@ -7302,8 +7302,8 @@
         </p:blipFill>
         <p:spPr>
           <a:xfrm>
-            <a:off x="1689144" y="862751"/>
-            <a:ext cx="5765712" cy="3875503"/>
+            <a:off x="1457539" y="804796"/>
+            <a:ext cx="6228921" cy="4168986"/>
           </a:xfrm>
           <a:prstGeom prst="rect">
             <a:avLst/>
@@ -7411,8 +7411,8 @@
           </a:ln>
         </p:spPr>
       </p:pic>
-      <mc:AlternateContent xmlns:mc="http://schemas.openxmlformats.org/markup-compatibility/2006">
-        <mc:Choice xmlns:a14="http://schemas.microsoft.com/office/drawing/2010/main" Requires="a14">
+      <mc:AlternateContent xmlns:mc="http://schemas.openxmlformats.org/markup-compatibility/2006" xmlns:a14="http://schemas.microsoft.com/office/drawing/2010/main">
+        <mc:Choice Requires="a14">
           <p:sp>
             <p:nvSpPr>
               <p:cNvPr id="2" name="TextBox 1">
@@ -7441,6 +7441,7 @@
               </a:bodyPr>
               <a:lstStyle/>
               <a:p>
+                <a:pPr/>
                 <a14:m>
                   <m:oMathPara xmlns:m="http://schemas.openxmlformats.org/officeDocument/2006/math">
                     <m:oMathParaPr>
@@ -7697,7 +7698,7 @@
             </p:txBody>
           </p:sp>
         </mc:Choice>
-        <mc:Fallback>
+        <mc:Fallback xmlns="">
           <p:sp>
             <p:nvSpPr>
               <p:cNvPr id="2" name="TextBox 1">
@@ -7815,8 +7816,8 @@
           </a:p>
         </p:txBody>
       </p:sp>
-      <mc:AlternateContent xmlns:mc="http://schemas.openxmlformats.org/markup-compatibility/2006">
-        <mc:Choice xmlns:a14="http://schemas.microsoft.com/office/drawing/2010/main" Requires="a14">
+      <mc:AlternateContent xmlns:mc="http://schemas.openxmlformats.org/markup-compatibility/2006" xmlns:a14="http://schemas.microsoft.com/office/drawing/2010/main">
+        <mc:Choice Requires="a14">
           <p:sp>
             <p:nvSpPr>
               <p:cNvPr id="2" name="TextBox 1">
@@ -7845,6 +7846,7 @@
               </a:bodyPr>
               <a:lstStyle/>
               <a:p>
+                <a:pPr/>
                 <a14:m>
                   <m:oMathPara xmlns:m="http://schemas.openxmlformats.org/officeDocument/2006/math">
                     <m:oMathParaPr>
@@ -8160,7 +8162,7 @@
             </p:txBody>
           </p:sp>
         </mc:Choice>
-        <mc:Fallback>
+        <mc:Fallback xmlns="">
           <p:sp>
             <p:nvSpPr>
               <p:cNvPr id="2" name="TextBox 1">
@@ -8205,36 +8207,6 @@
           </p:sp>
         </mc:Fallback>
       </mc:AlternateContent>
-      <p:pic>
-        <p:nvPicPr>
-          <p:cNvPr id="3" name="Рисунок 2">
-            <a:extLst>
-              <a:ext uri="{FF2B5EF4-FFF2-40B4-BE49-F238E27FC236}">
-                <a16:creationId xmlns:a16="http://schemas.microsoft.com/office/drawing/2014/main" id="{2888F1E3-C06C-4E4E-BCB2-CF45908C9350}"/>
-              </a:ext>
-            </a:extLst>
-          </p:cNvPr>
-          <p:cNvPicPr>
-            <a:picLocks noChangeAspect="1"/>
-          </p:cNvPicPr>
-          <p:nvPr/>
-        </p:nvPicPr>
-        <p:blipFill>
-          <a:blip r:embed="rId4"/>
-          <a:stretch>
-            <a:fillRect/>
-          </a:stretch>
-        </p:blipFill>
-        <p:spPr>
-          <a:xfrm>
-            <a:off x="450190" y="2025598"/>
-            <a:ext cx="3858574" cy="2590199"/>
-          </a:xfrm>
-          <a:prstGeom prst="rect">
-            <a:avLst/>
-          </a:prstGeom>
-        </p:spPr>
-      </p:pic>
       <mc:AlternateContent xmlns:mc="http://schemas.openxmlformats.org/markup-compatibility/2006">
         <mc:Choice xmlns:a14="http://schemas.microsoft.com/office/drawing/2010/main" Requires="a14">
           <p:sp>
@@ -8252,7 +8224,7 @@
             <p:spPr>
               <a:xfrm>
                 <a:off x="4731327" y="1508981"/>
-                <a:ext cx="2380588" cy="217817"/>
+                <a:ext cx="2479974" cy="217817"/>
               </a:xfrm>
               <a:prstGeom prst="rect">
                 <a:avLst/>
@@ -8265,6 +8237,7 @@
               </a:bodyPr>
               <a:lstStyle/>
               <a:p>
+                <a:pPr/>
                 <a14:m>
                   <m:oMathPara xmlns:m="http://schemas.openxmlformats.org/officeDocument/2006/math">
                     <m:oMathParaPr>
@@ -8275,7 +8248,19 @@
                         <a:rPr lang="en-US" b="0" i="1" smtClean="0">
                           <a:latin typeface="Cambria Math" panose="02040503050406030204" pitchFamily="18" charset="0"/>
                         </a:rPr>
-                        <m:t>1.92+0.016</m:t>
+                        <m:t>1.995</m:t>
+                      </m:r>
+                      <m:r>
+                        <a:rPr lang="en-US" b="0" i="1" smtClean="0">
+                          <a:latin typeface="Cambria Math" panose="02040503050406030204" pitchFamily="18" charset="0"/>
+                        </a:rPr>
+                        <m:t>+0.01</m:t>
+                      </m:r>
+                      <m:r>
+                        <a:rPr lang="en-US" b="0" i="1" smtClean="0">
+                          <a:latin typeface="Cambria Math" panose="02040503050406030204" pitchFamily="18" charset="0"/>
+                        </a:rPr>
+                        <m:t>5</m:t>
                       </m:r>
                       <m:r>
                         <a:rPr lang="en-US" b="0" i="1" smtClean="0">
@@ -8287,7 +8272,13 @@
                         <a:rPr lang="en-US" b="0" i="1" smtClean="0">
                           <a:latin typeface="Cambria Math" panose="02040503050406030204" pitchFamily="18" charset="0"/>
                         </a:rPr>
-                        <m:t>−8.06⋅</m:t>
+                        <m:t>−1.21</m:t>
+                      </m:r>
+                      <m:r>
+                        <a:rPr lang="en-US" b="0" i="1" smtClean="0">
+                          <a:latin typeface="Cambria Math" panose="02040503050406030204" pitchFamily="18" charset="0"/>
+                        </a:rPr>
+                        <m:t>⋅</m:t>
                       </m:r>
                       <m:sSup>
                         <m:sSupPr>
@@ -8310,7 +8301,13 @@
                             <a:rPr lang="en-US" b="0" i="1" smtClean="0">
                               <a:latin typeface="Cambria Math" panose="02040503050406030204" pitchFamily="18" charset="0"/>
                             </a:rPr>
-                            <m:t>−5</m:t>
+                            <m:t>−</m:t>
+                          </m:r>
+                          <m:r>
+                            <a:rPr lang="en-US" b="0" i="1" smtClean="0">
+                              <a:latin typeface="Cambria Math" panose="02040503050406030204" pitchFamily="18" charset="0"/>
+                            </a:rPr>
+                            <m:t>4</m:t>
                           </m:r>
                         </m:sup>
                       </m:sSup>
@@ -8365,15 +8362,15 @@
             <p:spPr>
               <a:xfrm>
                 <a:off x="4731327" y="1508981"/>
-                <a:ext cx="2380588" cy="217817"/>
+                <a:ext cx="2479974" cy="217817"/>
               </a:xfrm>
               <a:prstGeom prst="rect">
                 <a:avLst/>
               </a:prstGeom>
               <a:blipFill>
-                <a:blip r:embed="rId5"/>
+                <a:blip r:embed="rId4"/>
                 <a:stretch>
-                  <a:fillRect l="-1023" b="-11429"/>
+                  <a:fillRect l="-983" b="-8571"/>
                 </a:stretch>
               </a:blipFill>
             </p:spPr>
@@ -8392,12 +8389,42 @@
           </p:sp>
         </mc:Fallback>
       </mc:AlternateContent>
+      <p:pic>
+        <p:nvPicPr>
+          <p:cNvPr id="5" name="Рисунок 4">
+            <a:extLst>
+              <a:ext uri="{FF2B5EF4-FFF2-40B4-BE49-F238E27FC236}">
+                <a16:creationId xmlns:a16="http://schemas.microsoft.com/office/drawing/2014/main" id="{2C4F0045-EFFF-441F-A99E-6D5DC086B9FA}"/>
+              </a:ext>
+            </a:extLst>
+          </p:cNvPr>
+          <p:cNvPicPr>
+            <a:picLocks noChangeAspect="1"/>
+          </p:cNvPicPr>
+          <p:nvPr/>
+        </p:nvPicPr>
+        <p:blipFill>
+          <a:blip r:embed="rId5"/>
+          <a:stretch>
+            <a:fillRect/>
+          </a:stretch>
+        </p:blipFill>
+        <p:spPr>
+          <a:xfrm>
+            <a:off x="642252" y="2164048"/>
+            <a:ext cx="3615432" cy="2420331"/>
+          </a:xfrm>
+          <a:prstGeom prst="rect">
+            <a:avLst/>
+          </a:prstGeom>
+        </p:spPr>
+      </p:pic>
       <p:grpSp>
         <p:nvGrpSpPr>
-          <p:cNvPr id="8" name="Группа 7">
+          <p:cNvPr id="15" name="Группа 14">
             <a:extLst>
               <a:ext uri="{FF2B5EF4-FFF2-40B4-BE49-F238E27FC236}">
-                <a16:creationId xmlns:a16="http://schemas.microsoft.com/office/drawing/2014/main" id="{FD29037D-985E-4947-8BE5-AB779B5EA919}"/>
+                <a16:creationId xmlns:a16="http://schemas.microsoft.com/office/drawing/2014/main" id="{94C0E216-549E-444F-A7B9-9FC4F9250E58}"/>
               </a:ext>
             </a:extLst>
           </p:cNvPr>
@@ -8406,7 +8433,7 @@
         </p:nvGrpSpPr>
         <p:grpSpPr>
           <a:xfrm>
-            <a:off x="4731327" y="2381600"/>
+            <a:off x="4731327" y="1938255"/>
             <a:ext cx="1271758" cy="1066448"/>
             <a:chOff x="4793140" y="2288082"/>
             <a:chExt cx="1271758" cy="1066448"/>
@@ -8416,10 +8443,10 @@
           <mc:Choice xmlns:a14="http://schemas.microsoft.com/office/drawing/2010/main" Requires="a14">
             <p:sp>
               <p:nvSpPr>
-                <p:cNvPr id="6" name="TextBox 5">
+                <p:cNvPr id="18" name="TextBox 17">
                   <a:extLst>
                     <a:ext uri="{FF2B5EF4-FFF2-40B4-BE49-F238E27FC236}">
-                      <a16:creationId xmlns:a16="http://schemas.microsoft.com/office/drawing/2014/main" id="{B68EB1C4-4A4E-461A-9AF6-F77DAA60D38B}"/>
+                      <a16:creationId xmlns:a16="http://schemas.microsoft.com/office/drawing/2014/main" id="{3405FB01-4580-4046-989E-4008657E16EF}"/>
                     </a:ext>
                   </a:extLst>
                 </p:cNvPr>
@@ -8429,7 +8456,7 @@
               <p:spPr>
                 <a:xfrm>
                   <a:off x="4793140" y="2288082"/>
-                  <a:ext cx="1216102" cy="215444"/>
+                  <a:ext cx="1228926" cy="215444"/>
                 </a:xfrm>
                 <a:prstGeom prst="rect">
                   <a:avLst/>
@@ -8442,6 +8469,7 @@
                 </a:bodyPr>
                 <a:lstStyle/>
                 <a:p>
+                  <a:pPr/>
                   <a14:m>
                     <m:oMathPara xmlns:m="http://schemas.openxmlformats.org/officeDocument/2006/math">
                       <m:oMathParaPr>
@@ -8458,7 +8486,29 @@
                           <a:rPr lang="en-US" b="0" i="1" smtClean="0">
                             <a:latin typeface="Cambria Math" panose="02040503050406030204" pitchFamily="18" charset="0"/>
                           </a:rPr>
-                          <m:t>=4.69⋅</m:t>
+                          <m:t>=</m:t>
+                        </m:r>
+                        <m:r>
+                          <m:rPr>
+                            <m:nor/>
+                          </m:rPr>
+                          <a:rPr lang="ru-RU">
+                            <a:latin typeface="Times New Roman" panose="02020603050405020304" pitchFamily="18" charset="0"/>
+                            <a:cs typeface="Times New Roman" panose="02020603050405020304" pitchFamily="18" charset="0"/>
+                          </a:rPr>
+                          <m:t>5.7</m:t>
+                        </m:r>
+                        <m:r>
+                          <a:rPr lang="en-US" b="0" i="1" smtClean="0">
+                            <a:latin typeface="Cambria Math" panose="02040503050406030204" pitchFamily="18" charset="0"/>
+                          </a:rPr>
+                          <m:t>4</m:t>
+                        </m:r>
+                        <m:r>
+                          <a:rPr lang="en-US" b="0" i="1" smtClean="0">
+                            <a:latin typeface="Cambria Math" panose="02040503050406030204" pitchFamily="18" charset="0"/>
+                          </a:rPr>
+                          <m:t>⋅</m:t>
                         </m:r>
                         <m:sSup>
                           <m:sSupPr>
@@ -8496,10 +8546,10 @@
           <mc:Fallback>
             <p:sp>
               <p:nvSpPr>
-                <p:cNvPr id="6" name="TextBox 5">
+                <p:cNvPr id="18" name="TextBox 17">
                   <a:extLst>
                     <a:ext uri="{FF2B5EF4-FFF2-40B4-BE49-F238E27FC236}">
-                      <a16:creationId xmlns:a16="http://schemas.microsoft.com/office/drawing/2014/main" id="{B68EB1C4-4A4E-461A-9AF6-F77DAA60D38B}"/>
+                      <a16:creationId xmlns:a16="http://schemas.microsoft.com/office/drawing/2014/main" id="{3405FB01-4580-4046-989E-4008657E16EF}"/>
                     </a:ext>
                   </a:extLst>
                 </p:cNvPr>
@@ -8511,7 +8561,7 @@
               <p:spPr>
                 <a:xfrm>
                   <a:off x="4793140" y="2288082"/>
-                  <a:ext cx="1216102" cy="215444"/>
+                  <a:ext cx="1228926" cy="215444"/>
                 </a:xfrm>
                 <a:prstGeom prst="rect">
                   <a:avLst/>
@@ -8519,7 +8569,7 @@
                 <a:blipFill>
                   <a:blip r:embed="rId6"/>
                   <a:stretch>
-                    <a:fillRect l="-1000" b="-8571"/>
+                    <a:fillRect b="-8571"/>
                   </a:stretch>
                 </a:blipFill>
               </p:spPr>
@@ -8540,10 +8590,10 @@
         </mc:AlternateContent>
         <p:grpSp>
           <p:nvGrpSpPr>
-            <p:cNvPr id="7" name="Группа 6">
+            <p:cNvPr id="19" name="Группа 18">
               <a:extLst>
                 <a:ext uri="{FF2B5EF4-FFF2-40B4-BE49-F238E27FC236}">
-                  <a16:creationId xmlns:a16="http://schemas.microsoft.com/office/drawing/2014/main" id="{6FB9E88C-3BE7-48B9-B74B-50E5386AEFF6}"/>
+                  <a16:creationId xmlns:a16="http://schemas.microsoft.com/office/drawing/2014/main" id="{40E57EC2-B755-4C39-B398-93C32CFF27B6}"/>
                 </a:ext>
               </a:extLst>
             </p:cNvPr>
@@ -8562,10 +8612,10 @@
             <mc:Choice xmlns:a14="http://schemas.microsoft.com/office/drawing/2010/main" Requires="a14">
               <p:sp>
                 <p:nvSpPr>
-                  <p:cNvPr id="14" name="TextBox 13">
+                  <p:cNvPr id="20" name="TextBox 19">
                     <a:extLst>
                       <a:ext uri="{FF2B5EF4-FFF2-40B4-BE49-F238E27FC236}">
-                        <a16:creationId xmlns:a16="http://schemas.microsoft.com/office/drawing/2014/main" id="{3E174877-2924-4263-AB08-85C552D231B8}"/>
+                        <a16:creationId xmlns:a16="http://schemas.microsoft.com/office/drawing/2014/main" id="{E50FEDA5-F0A4-44D5-9BC2-5241326E80B8}"/>
                       </a:ext>
                     </a:extLst>
                   </p:cNvPr>
@@ -8575,7 +8625,7 @@
                 <p:spPr>
                   <a:xfrm>
                     <a:off x="6660739" y="2880749"/>
-                    <a:ext cx="961032" cy="215444"/>
+                    <a:ext cx="941796" cy="215444"/>
                   </a:xfrm>
                   <a:prstGeom prst="rect">
                     <a:avLst/>
@@ -8600,7 +8650,7 @@
                           <a:rPr lang="en-US" b="0" i="1" smtClean="0">
                             <a:latin typeface="Cambria Math" panose="02040503050406030204" pitchFamily="18" charset="0"/>
                           </a:rPr>
-                          <m:t>=2.76</m:t>
+                          <m:t>=2.48</m:t>
                         </m:r>
                       </m:oMath>
                     </a14:m>
@@ -8625,10 +8675,10 @@
             <mc:Fallback>
               <p:sp>
                 <p:nvSpPr>
-                  <p:cNvPr id="14" name="TextBox 13">
+                  <p:cNvPr id="20" name="TextBox 19">
                     <a:extLst>
                       <a:ext uri="{FF2B5EF4-FFF2-40B4-BE49-F238E27FC236}">
-                        <a16:creationId xmlns:a16="http://schemas.microsoft.com/office/drawing/2014/main" id="{3E174877-2924-4263-AB08-85C552D231B8}"/>
+                        <a16:creationId xmlns:a16="http://schemas.microsoft.com/office/drawing/2014/main" id="{E50FEDA5-F0A4-44D5-9BC2-5241326E80B8}"/>
                       </a:ext>
                     </a:extLst>
                   </p:cNvPr>
@@ -8640,7 +8690,7 @@
                 <p:spPr>
                   <a:xfrm>
                     <a:off x="6660739" y="2880749"/>
-                    <a:ext cx="961032" cy="215444"/>
+                    <a:ext cx="941796" cy="215444"/>
                   </a:xfrm>
                   <a:prstGeom prst="rect">
                     <a:avLst/>
@@ -8648,7 +8698,7 @@
                   <a:blipFill>
                     <a:blip r:embed="rId7"/>
                     <a:stretch>
-                      <a:fillRect l="-6329" t="-25000" r="-7595" b="-47222"/>
+                      <a:fillRect l="-6452" t="-25000" r="-9677" b="-47222"/>
                     </a:stretch>
                   </a:blipFill>
                 </p:spPr>
@@ -8671,10 +8721,10 @@
             <mc:Choice xmlns:a14="http://schemas.microsoft.com/office/drawing/2010/main" Requires="a14">
               <p:sp>
                 <p:nvSpPr>
-                  <p:cNvPr id="16" name="TextBox 15">
+                  <p:cNvPr id="21" name="TextBox 20">
                     <a:extLst>
                       <a:ext uri="{FF2B5EF4-FFF2-40B4-BE49-F238E27FC236}">
-                        <a16:creationId xmlns:a16="http://schemas.microsoft.com/office/drawing/2014/main" id="{D23006E1-5F57-4DFF-94EE-460A504F8116}"/>
+                        <a16:creationId xmlns:a16="http://schemas.microsoft.com/office/drawing/2014/main" id="{6428C494-6BD6-410B-AABF-21389BD4DA29}"/>
                       </a:ext>
                     </a:extLst>
                   </p:cNvPr>
@@ -8721,7 +8771,7 @@
                           <a:rPr lang="en-US" b="0" i="1" smtClean="0">
                             <a:latin typeface="Cambria Math" panose="02040503050406030204" pitchFamily="18" charset="0"/>
                           </a:rPr>
-                          <m:t>=1.92</m:t>
+                          <m:t>=1.98</m:t>
                         </m:r>
                       </m:oMath>
                     </a14:m>
@@ -8746,10 +8796,10 @@
             <mc:Fallback>
               <p:sp>
                 <p:nvSpPr>
-                  <p:cNvPr id="16" name="TextBox 15">
+                  <p:cNvPr id="21" name="TextBox 20">
                     <a:extLst>
                       <a:ext uri="{FF2B5EF4-FFF2-40B4-BE49-F238E27FC236}">
-                        <a16:creationId xmlns:a16="http://schemas.microsoft.com/office/drawing/2014/main" id="{D23006E1-5F57-4DFF-94EE-460A504F8116}"/>
+                        <a16:creationId xmlns:a16="http://schemas.microsoft.com/office/drawing/2014/main" id="{6428C494-6BD6-410B-AABF-21389BD4DA29}"/>
                       </a:ext>
                     </a:extLst>
                   </p:cNvPr>
@@ -8792,10 +8842,10 @@
             <mc:Choice xmlns:a14="http://schemas.microsoft.com/office/drawing/2010/main" Requires="a14">
               <p:sp>
                 <p:nvSpPr>
-                  <p:cNvPr id="17" name="TextBox 16">
+                  <p:cNvPr id="22" name="TextBox 21">
                     <a:extLst>
                       <a:ext uri="{FF2B5EF4-FFF2-40B4-BE49-F238E27FC236}">
-                        <a16:creationId xmlns:a16="http://schemas.microsoft.com/office/drawing/2014/main" id="{3B9461E7-ADE6-4EB3-B3C5-3727913C03A6}"/>
+                        <a16:creationId xmlns:a16="http://schemas.microsoft.com/office/drawing/2014/main" id="{E95A0EDD-FAAA-4505-A78E-3DE7A55BD647}"/>
                       </a:ext>
                     </a:extLst>
                   </p:cNvPr>
@@ -8830,7 +8880,7 @@
                           <a:rPr lang="en-US" b="0" i="1" smtClean="0">
                             <a:latin typeface="Cambria Math" panose="02040503050406030204" pitchFamily="18" charset="0"/>
                           </a:rPr>
-                          <m:t>=0.84</m:t>
+                          <m:t>=0.49</m:t>
                         </m:r>
                       </m:oMath>
                     </a14:m>
@@ -8855,10 +8905,10 @@
             <mc:Fallback>
               <p:sp>
                 <p:nvSpPr>
-                  <p:cNvPr id="17" name="TextBox 16">
+                  <p:cNvPr id="22" name="TextBox 21">
                     <a:extLst>
                       <a:ext uri="{FF2B5EF4-FFF2-40B4-BE49-F238E27FC236}">
-                        <a16:creationId xmlns:a16="http://schemas.microsoft.com/office/drawing/2014/main" id="{3B9461E7-ADE6-4EB3-B3C5-3727913C03A6}"/>
+                        <a16:creationId xmlns:a16="http://schemas.microsoft.com/office/drawing/2014/main" id="{E95A0EDD-FAAA-4505-A78E-3DE7A55BD647}"/>
                       </a:ext>
                     </a:extLst>
                   </p:cNvPr>
@@ -8878,7 +8928,7 @@
                   <a:blipFill>
                     <a:blip r:embed="rId9"/>
                     <a:stretch>
-                      <a:fillRect l="-6579" t="-25000" r="-9868" b="-47222"/>
+                      <a:fillRect l="-6579" t="-28571" r="-9868" b="-51429"/>
                     </a:stretch>
                   </a:blipFill>
                 </p:spPr>
@@ -8974,10 +9024,10 @@
       </p:sp>
       <p:pic>
         <p:nvPicPr>
-          <p:cNvPr id="2" name="Рисунок 1">
+          <p:cNvPr id="3" name="Рисунок 2">
             <a:extLst>
               <a:ext uri="{FF2B5EF4-FFF2-40B4-BE49-F238E27FC236}">
-                <a16:creationId xmlns:a16="http://schemas.microsoft.com/office/drawing/2014/main" id="{84CF0AA6-BA1B-48FB-92CF-4F98A9AEDA05}"/>
+                <a16:creationId xmlns:a16="http://schemas.microsoft.com/office/drawing/2014/main" id="{9CAB65C4-802E-4CE6-A505-2E1F29ED38C8}"/>
               </a:ext>
             </a:extLst>
           </p:cNvPr>
@@ -8994,8 +9044,8 @@
         </p:blipFill>
         <p:spPr>
           <a:xfrm>
-            <a:off x="1845518" y="1092034"/>
-            <a:ext cx="5452963" cy="3441865"/>
+            <a:off x="1481593" y="1017725"/>
+            <a:ext cx="6180813" cy="3904131"/>
           </a:xfrm>
           <a:prstGeom prst="rect">
             <a:avLst/>
@@ -9092,10 +9142,10 @@
       </p:sp>
       <p:pic>
         <p:nvPicPr>
-          <p:cNvPr id="2" name="Рисунок 1">
+          <p:cNvPr id="3" name="Рисунок 2">
             <a:extLst>
               <a:ext uri="{FF2B5EF4-FFF2-40B4-BE49-F238E27FC236}">
-                <a16:creationId xmlns:a16="http://schemas.microsoft.com/office/drawing/2014/main" id="{93F6B7F5-57E5-476B-A415-2C96EB8B3FDB}"/>
+                <a16:creationId xmlns:a16="http://schemas.microsoft.com/office/drawing/2014/main" id="{60E8E443-EE9F-4803-AA21-A2C9A42E0668}"/>
               </a:ext>
             </a:extLst>
           </p:cNvPr>
@@ -9112,8 +9162,8 @@
         </p:blipFill>
         <p:spPr>
           <a:xfrm>
-            <a:off x="1996380" y="1430482"/>
-            <a:ext cx="5151240" cy="3345872"/>
+            <a:off x="1934060" y="1406235"/>
+            <a:ext cx="5275880" cy="3425111"/>
           </a:xfrm>
           <a:prstGeom prst="rect">
             <a:avLst/>
@@ -9267,10 +9317,10 @@
       </p:sp>
       <p:grpSp>
         <p:nvGrpSpPr>
-          <p:cNvPr id="7" name="Группа 6">
+          <p:cNvPr id="13" name="Группа 12">
             <a:extLst>
               <a:ext uri="{FF2B5EF4-FFF2-40B4-BE49-F238E27FC236}">
-                <a16:creationId xmlns:a16="http://schemas.microsoft.com/office/drawing/2014/main" id="{584CFC15-A5A1-4672-A9C9-B7E5CEFCFFF8}"/>
+                <a16:creationId xmlns:a16="http://schemas.microsoft.com/office/drawing/2014/main" id="{D86B7FD5-7934-4849-99EB-A16D22B0487F}"/>
               </a:ext>
             </a:extLst>
           </p:cNvPr>
@@ -9279,7 +9329,7 @@
         </p:nvGrpSpPr>
         <p:grpSpPr>
           <a:xfrm>
-            <a:off x="886691" y="2866509"/>
+            <a:off x="865909" y="2933035"/>
             <a:ext cx="1271758" cy="1066448"/>
             <a:chOff x="4793140" y="2288082"/>
             <a:chExt cx="1271758" cy="1066448"/>
@@ -9289,10 +9339,10 @@
           <mc:Choice xmlns:a14="http://schemas.microsoft.com/office/drawing/2010/main" Requires="a14">
             <p:sp>
               <p:nvSpPr>
-                <p:cNvPr id="8" name="TextBox 7">
+                <p:cNvPr id="14" name="TextBox 13">
                   <a:extLst>
                     <a:ext uri="{FF2B5EF4-FFF2-40B4-BE49-F238E27FC236}">
-                      <a16:creationId xmlns:a16="http://schemas.microsoft.com/office/drawing/2014/main" id="{16ADCA69-84BE-4B12-8B2C-16A5153FABEC}"/>
+                      <a16:creationId xmlns:a16="http://schemas.microsoft.com/office/drawing/2014/main" id="{91E5EEEB-F3F5-465F-B48E-7967022607D7}"/>
                     </a:ext>
                   </a:extLst>
                 </p:cNvPr>
@@ -9302,7 +9352,7 @@
               <p:spPr>
                 <a:xfrm>
                   <a:off x="4793140" y="2288082"/>
-                  <a:ext cx="1216102" cy="215444"/>
+                  <a:ext cx="1228926" cy="215444"/>
                 </a:xfrm>
                 <a:prstGeom prst="rect">
                   <a:avLst/>
@@ -9315,6 +9365,7 @@
                 </a:bodyPr>
                 <a:lstStyle/>
                 <a:p>
+                  <a:pPr/>
                   <a14:m>
                     <m:oMathPara xmlns:m="http://schemas.openxmlformats.org/officeDocument/2006/math">
                       <m:oMathParaPr>
@@ -9331,7 +9382,29 @@
                           <a:rPr lang="en-US" b="0" i="1" smtClean="0">
                             <a:latin typeface="Cambria Math" panose="02040503050406030204" pitchFamily="18" charset="0"/>
                           </a:rPr>
-                          <m:t>=4.69⋅</m:t>
+                          <m:t>=</m:t>
+                        </m:r>
+                        <m:r>
+                          <m:rPr>
+                            <m:nor/>
+                          </m:rPr>
+                          <a:rPr lang="ru-RU">
+                            <a:latin typeface="Times New Roman" panose="02020603050405020304" pitchFamily="18" charset="0"/>
+                            <a:cs typeface="Times New Roman" panose="02020603050405020304" pitchFamily="18" charset="0"/>
+                          </a:rPr>
+                          <m:t>5.7</m:t>
+                        </m:r>
+                        <m:r>
+                          <a:rPr lang="en-US" b="0" i="1" smtClean="0">
+                            <a:latin typeface="Cambria Math" panose="02040503050406030204" pitchFamily="18" charset="0"/>
+                          </a:rPr>
+                          <m:t>4</m:t>
+                        </m:r>
+                        <m:r>
+                          <a:rPr lang="en-US" b="0" i="1" smtClean="0">
+                            <a:latin typeface="Cambria Math" panose="02040503050406030204" pitchFamily="18" charset="0"/>
+                          </a:rPr>
+                          <m:t>⋅</m:t>
                         </m:r>
                         <m:sSup>
                           <m:sSupPr>
@@ -9369,10 +9442,10 @@
           <mc:Fallback>
             <p:sp>
               <p:nvSpPr>
-                <p:cNvPr id="8" name="TextBox 7">
+                <p:cNvPr id="14" name="TextBox 13">
                   <a:extLst>
                     <a:ext uri="{FF2B5EF4-FFF2-40B4-BE49-F238E27FC236}">
-                      <a16:creationId xmlns:a16="http://schemas.microsoft.com/office/drawing/2014/main" id="{16ADCA69-84BE-4B12-8B2C-16A5153FABEC}"/>
+                      <a16:creationId xmlns:a16="http://schemas.microsoft.com/office/drawing/2014/main" id="{91E5EEEB-F3F5-465F-B48E-7967022607D7}"/>
                     </a:ext>
                   </a:extLst>
                 </p:cNvPr>
@@ -9384,7 +9457,7 @@
               <p:spPr>
                 <a:xfrm>
                   <a:off x="4793140" y="2288082"/>
-                  <a:ext cx="1216102" cy="215444"/>
+                  <a:ext cx="1228926" cy="215444"/>
                 </a:xfrm>
                 <a:prstGeom prst="rect">
                   <a:avLst/>
@@ -9392,7 +9465,7 @@
                 <a:blipFill>
                   <a:blip r:embed="rId3"/>
                   <a:stretch>
-                    <a:fillRect l="-1000" b="-5556"/>
+                    <a:fillRect b="-8571"/>
                   </a:stretch>
                 </a:blipFill>
               </p:spPr>
@@ -9413,10 +9486,10 @@
         </mc:AlternateContent>
         <p:grpSp>
           <p:nvGrpSpPr>
-            <p:cNvPr id="9" name="Группа 8">
+            <p:cNvPr id="15" name="Группа 14">
               <a:extLst>
                 <a:ext uri="{FF2B5EF4-FFF2-40B4-BE49-F238E27FC236}">
-                  <a16:creationId xmlns:a16="http://schemas.microsoft.com/office/drawing/2014/main" id="{88C3ACC2-98A8-4F34-9C09-BF65C82CC4EB}"/>
+                  <a16:creationId xmlns:a16="http://schemas.microsoft.com/office/drawing/2014/main" id="{93A63933-D10D-4950-8392-A1DCD92662D9}"/>
                 </a:ext>
               </a:extLst>
             </p:cNvPr>
@@ -9435,10 +9508,10 @@
             <mc:Choice xmlns:a14="http://schemas.microsoft.com/office/drawing/2010/main" Requires="a14">
               <p:sp>
                 <p:nvSpPr>
-                  <p:cNvPr id="10" name="TextBox 9">
+                  <p:cNvPr id="16" name="TextBox 15">
                     <a:extLst>
                       <a:ext uri="{FF2B5EF4-FFF2-40B4-BE49-F238E27FC236}">
-                        <a16:creationId xmlns:a16="http://schemas.microsoft.com/office/drawing/2014/main" id="{AD1925DA-9585-4630-8A9F-FE744A561A9C}"/>
+                        <a16:creationId xmlns:a16="http://schemas.microsoft.com/office/drawing/2014/main" id="{6EC3249D-4A87-45C6-BAD8-8914A3809C94}"/>
                       </a:ext>
                     </a:extLst>
                   </p:cNvPr>
@@ -9448,7 +9521,7 @@
                 <p:spPr>
                   <a:xfrm>
                     <a:off x="6660739" y="2880749"/>
-                    <a:ext cx="961032" cy="215444"/>
+                    <a:ext cx="941796" cy="215444"/>
                   </a:xfrm>
                   <a:prstGeom prst="rect">
                     <a:avLst/>
@@ -9473,7 +9546,7 @@
                           <a:rPr lang="en-US" b="0" i="1" smtClean="0">
                             <a:latin typeface="Cambria Math" panose="02040503050406030204" pitchFamily="18" charset="0"/>
                           </a:rPr>
-                          <m:t>=2.76</m:t>
+                          <m:t>=2.48</m:t>
                         </m:r>
                       </m:oMath>
                     </a14:m>
@@ -9498,10 +9571,10 @@
             <mc:Fallback>
               <p:sp>
                 <p:nvSpPr>
-                  <p:cNvPr id="10" name="TextBox 9">
+                  <p:cNvPr id="16" name="TextBox 15">
                     <a:extLst>
                       <a:ext uri="{FF2B5EF4-FFF2-40B4-BE49-F238E27FC236}">
-                        <a16:creationId xmlns:a16="http://schemas.microsoft.com/office/drawing/2014/main" id="{AD1925DA-9585-4630-8A9F-FE744A561A9C}"/>
+                        <a16:creationId xmlns:a16="http://schemas.microsoft.com/office/drawing/2014/main" id="{6EC3249D-4A87-45C6-BAD8-8914A3809C94}"/>
                       </a:ext>
                     </a:extLst>
                   </p:cNvPr>
@@ -9513,7 +9586,7 @@
                 <p:spPr>
                   <a:xfrm>
                     <a:off x="6660739" y="2880749"/>
-                    <a:ext cx="961032" cy="215444"/>
+                    <a:ext cx="941796" cy="215444"/>
                   </a:xfrm>
                   <a:prstGeom prst="rect">
                     <a:avLst/>
@@ -9521,7 +9594,7 @@
                   <a:blipFill>
                     <a:blip r:embed="rId4"/>
                     <a:stretch>
-                      <a:fillRect l="-6329" t="-25714" r="-7595" b="-51429"/>
+                      <a:fillRect l="-6452" t="-28571" r="-9677" b="-51429"/>
                     </a:stretch>
                   </a:blipFill>
                 </p:spPr>
@@ -9544,10 +9617,10 @@
             <mc:Choice xmlns:a14="http://schemas.microsoft.com/office/drawing/2010/main" Requires="a14">
               <p:sp>
                 <p:nvSpPr>
-                  <p:cNvPr id="11" name="TextBox 10">
+                  <p:cNvPr id="17" name="TextBox 16">
                     <a:extLst>
                       <a:ext uri="{FF2B5EF4-FFF2-40B4-BE49-F238E27FC236}">
-                        <a16:creationId xmlns:a16="http://schemas.microsoft.com/office/drawing/2014/main" id="{1EB1A72F-BF3B-447D-8509-6A041321DB53}"/>
+                        <a16:creationId xmlns:a16="http://schemas.microsoft.com/office/drawing/2014/main" id="{5DFE5982-D44E-4CB7-BAFD-3F84669B38C5}"/>
                       </a:ext>
                     </a:extLst>
                   </p:cNvPr>
@@ -9594,7 +9667,7 @@
                           <a:rPr lang="en-US" b="0" i="1" smtClean="0">
                             <a:latin typeface="Cambria Math" panose="02040503050406030204" pitchFamily="18" charset="0"/>
                           </a:rPr>
-                          <m:t>=1.92</m:t>
+                          <m:t>=1.98</m:t>
                         </m:r>
                       </m:oMath>
                     </a14:m>
@@ -9619,10 +9692,10 @@
             <mc:Fallback>
               <p:sp>
                 <p:nvSpPr>
-                  <p:cNvPr id="11" name="TextBox 10">
+                  <p:cNvPr id="17" name="TextBox 16">
                     <a:extLst>
                       <a:ext uri="{FF2B5EF4-FFF2-40B4-BE49-F238E27FC236}">
-                        <a16:creationId xmlns:a16="http://schemas.microsoft.com/office/drawing/2014/main" id="{1EB1A72F-BF3B-447D-8509-6A041321DB53}"/>
+                        <a16:creationId xmlns:a16="http://schemas.microsoft.com/office/drawing/2014/main" id="{5DFE5982-D44E-4CB7-BAFD-3F84669B38C5}"/>
                       </a:ext>
                     </a:extLst>
                   </p:cNvPr>
@@ -9665,10 +9738,10 @@
             <mc:Choice xmlns:a14="http://schemas.microsoft.com/office/drawing/2010/main" Requires="a14">
               <p:sp>
                 <p:nvSpPr>
-                  <p:cNvPr id="12" name="TextBox 11">
+                  <p:cNvPr id="18" name="TextBox 17">
                     <a:extLst>
                       <a:ext uri="{FF2B5EF4-FFF2-40B4-BE49-F238E27FC236}">
-                        <a16:creationId xmlns:a16="http://schemas.microsoft.com/office/drawing/2014/main" id="{3B426F44-C6D4-4DDF-92F1-5EEA06D6D45B}"/>
+                        <a16:creationId xmlns:a16="http://schemas.microsoft.com/office/drawing/2014/main" id="{BD8D5DC6-06C8-4A69-8FE0-329101225211}"/>
                       </a:ext>
                     </a:extLst>
                   </p:cNvPr>
@@ -9703,7 +9776,7 @@
                           <a:rPr lang="en-US" b="0" i="1" smtClean="0">
                             <a:latin typeface="Cambria Math" panose="02040503050406030204" pitchFamily="18" charset="0"/>
                           </a:rPr>
-                          <m:t>=0.84</m:t>
+                          <m:t>=0.49</m:t>
                         </m:r>
                       </m:oMath>
                     </a14:m>
@@ -9728,10 +9801,10 @@
             <mc:Fallback>
               <p:sp>
                 <p:nvSpPr>
-                  <p:cNvPr id="12" name="TextBox 11">
+                  <p:cNvPr id="18" name="TextBox 17">
                     <a:extLst>
                       <a:ext uri="{FF2B5EF4-FFF2-40B4-BE49-F238E27FC236}">
-                        <a16:creationId xmlns:a16="http://schemas.microsoft.com/office/drawing/2014/main" id="{3B426F44-C6D4-4DDF-92F1-5EEA06D6D45B}"/>
+                        <a16:creationId xmlns:a16="http://schemas.microsoft.com/office/drawing/2014/main" id="{BD8D5DC6-06C8-4A69-8FE0-329101225211}"/>
                       </a:ext>
                     </a:extLst>
                   </p:cNvPr>
@@ -9751,7 +9824,7 @@
                   <a:blipFill>
                     <a:blip r:embed="rId6"/>
                     <a:stretch>
-                      <a:fillRect l="-6536" t="-25714" r="-9150" b="-51429"/>
+                      <a:fillRect l="-6579" t="-28571" r="-9868" b="-51429"/>
                     </a:stretch>
                   </a:blipFill>
                 </p:spPr>

</xml_diff>